<commit_message>
minor edits to analysis
</commit_message>
<xml_diff>
--- a/Figures/Figure_1_stuff/figure_1_editing.pptx
+++ b/Figures/Figure_1_stuff/figure_1_editing.pptx
@@ -2,19 +2,19 @@
 <file path=ppt/presentation.xml><?xml version="1.0" encoding="utf-8"?>
 <p:presentation xmlns:a="http://schemas.openxmlformats.org/drawingml/2006/main" xmlns:r="http://schemas.openxmlformats.org/officeDocument/2006/relationships" xmlns:p="http://schemas.openxmlformats.org/presentationml/2006/main" saveSubsetFonts="1">
   <p:sldMasterIdLst>
-    <p:sldMasterId id="2147483648" r:id="rId1"/>
+    <p:sldMasterId id="2147483660" r:id="rId1"/>
   </p:sldMasterIdLst>
   <p:sldIdLst>
     <p:sldId id="256" r:id="rId2"/>
   </p:sldIdLst>
-  <p:sldSz cx="12192000" cy="6858000"/>
+  <p:sldSz cx="7772400" cy="6673850"/>
   <p:notesSz cx="6858000" cy="9144000"/>
   <p:defaultTextStyle>
     <a:defPPr>
       <a:defRPr lang="en-US"/>
     </a:defPPr>
-    <a:lvl1pPr marL="0" algn="l" defTabSz="914400" rtl="0" eaLnBrk="1" latinLnBrk="0" hangingPunct="1">
-      <a:defRPr sz="1800" kern="1200">
+    <a:lvl1pPr marL="0" algn="l" defTabSz="693390" rtl="0" eaLnBrk="1" latinLnBrk="0" hangingPunct="1">
+      <a:defRPr sz="1365" kern="1200">
         <a:solidFill>
           <a:schemeClr val="tx1"/>
         </a:solidFill>
@@ -23,8 +23,8 @@
         <a:cs typeface="+mn-cs"/>
       </a:defRPr>
     </a:lvl1pPr>
-    <a:lvl2pPr marL="457200" algn="l" defTabSz="914400" rtl="0" eaLnBrk="1" latinLnBrk="0" hangingPunct="1">
-      <a:defRPr sz="1800" kern="1200">
+    <a:lvl2pPr marL="346695" algn="l" defTabSz="693390" rtl="0" eaLnBrk="1" latinLnBrk="0" hangingPunct="1">
+      <a:defRPr sz="1365" kern="1200">
         <a:solidFill>
           <a:schemeClr val="tx1"/>
         </a:solidFill>
@@ -33,8 +33,8 @@
         <a:cs typeface="+mn-cs"/>
       </a:defRPr>
     </a:lvl2pPr>
-    <a:lvl3pPr marL="914400" algn="l" defTabSz="914400" rtl="0" eaLnBrk="1" latinLnBrk="0" hangingPunct="1">
-      <a:defRPr sz="1800" kern="1200">
+    <a:lvl3pPr marL="693390" algn="l" defTabSz="693390" rtl="0" eaLnBrk="1" latinLnBrk="0" hangingPunct="1">
+      <a:defRPr sz="1365" kern="1200">
         <a:solidFill>
           <a:schemeClr val="tx1"/>
         </a:solidFill>
@@ -43,8 +43,8 @@
         <a:cs typeface="+mn-cs"/>
       </a:defRPr>
     </a:lvl3pPr>
-    <a:lvl4pPr marL="1371600" algn="l" defTabSz="914400" rtl="0" eaLnBrk="1" latinLnBrk="0" hangingPunct="1">
-      <a:defRPr sz="1800" kern="1200">
+    <a:lvl4pPr marL="1040084" algn="l" defTabSz="693390" rtl="0" eaLnBrk="1" latinLnBrk="0" hangingPunct="1">
+      <a:defRPr sz="1365" kern="1200">
         <a:solidFill>
           <a:schemeClr val="tx1"/>
         </a:solidFill>
@@ -53,8 +53,8 @@
         <a:cs typeface="+mn-cs"/>
       </a:defRPr>
     </a:lvl4pPr>
-    <a:lvl5pPr marL="1828800" algn="l" defTabSz="914400" rtl="0" eaLnBrk="1" latinLnBrk="0" hangingPunct="1">
-      <a:defRPr sz="1800" kern="1200">
+    <a:lvl5pPr marL="1386779" algn="l" defTabSz="693390" rtl="0" eaLnBrk="1" latinLnBrk="0" hangingPunct="1">
+      <a:defRPr sz="1365" kern="1200">
         <a:solidFill>
           <a:schemeClr val="tx1"/>
         </a:solidFill>
@@ -63,8 +63,8 @@
         <a:cs typeface="+mn-cs"/>
       </a:defRPr>
     </a:lvl5pPr>
-    <a:lvl6pPr marL="2286000" algn="l" defTabSz="914400" rtl="0" eaLnBrk="1" latinLnBrk="0" hangingPunct="1">
-      <a:defRPr sz="1800" kern="1200">
+    <a:lvl6pPr marL="1733474" algn="l" defTabSz="693390" rtl="0" eaLnBrk="1" latinLnBrk="0" hangingPunct="1">
+      <a:defRPr sz="1365" kern="1200">
         <a:solidFill>
           <a:schemeClr val="tx1"/>
         </a:solidFill>
@@ -73,8 +73,8 @@
         <a:cs typeface="+mn-cs"/>
       </a:defRPr>
     </a:lvl6pPr>
-    <a:lvl7pPr marL="2743200" algn="l" defTabSz="914400" rtl="0" eaLnBrk="1" latinLnBrk="0" hangingPunct="1">
-      <a:defRPr sz="1800" kern="1200">
+    <a:lvl7pPr marL="2080169" algn="l" defTabSz="693390" rtl="0" eaLnBrk="1" latinLnBrk="0" hangingPunct="1">
+      <a:defRPr sz="1365" kern="1200">
         <a:solidFill>
           <a:schemeClr val="tx1"/>
         </a:solidFill>
@@ -83,8 +83,8 @@
         <a:cs typeface="+mn-cs"/>
       </a:defRPr>
     </a:lvl7pPr>
-    <a:lvl8pPr marL="3200400" algn="l" defTabSz="914400" rtl="0" eaLnBrk="1" latinLnBrk="0" hangingPunct="1">
-      <a:defRPr sz="1800" kern="1200">
+    <a:lvl8pPr marL="2426863" algn="l" defTabSz="693390" rtl="0" eaLnBrk="1" latinLnBrk="0" hangingPunct="1">
+      <a:defRPr sz="1365" kern="1200">
         <a:solidFill>
           <a:schemeClr val="tx1"/>
         </a:solidFill>
@@ -93,8 +93,8 @@
         <a:cs typeface="+mn-cs"/>
       </a:defRPr>
     </a:lvl8pPr>
-    <a:lvl9pPr marL="3657600" algn="l" defTabSz="914400" rtl="0" eaLnBrk="1" latinLnBrk="0" hangingPunct="1">
-      <a:defRPr sz="1800" kern="1200">
+    <a:lvl9pPr marL="2773558" algn="l" defTabSz="693390" rtl="0" eaLnBrk="1" latinLnBrk="0" hangingPunct="1">
+      <a:defRPr sz="1365" kern="1200">
         <a:solidFill>
           <a:schemeClr val="tx1"/>
         </a:solidFill>
@@ -104,6 +104,11 @@
       </a:defRPr>
     </a:lvl9pPr>
   </p:defaultTextStyle>
+  <p:extLst>
+    <p:ext uri="{EFAFB233-063F-42B5-8137-9DF3F51BA10A}">
+      <p15:sldGuideLst xmlns:p15="http://schemas.microsoft.com/office/powerpoint/2012/main"/>
+    </p:ext>
+  </p:extLst>
 </p:presentation>
 </file>
 
@@ -136,15 +141,15 @@
         </p:nvSpPr>
         <p:spPr>
           <a:xfrm>
-            <a:off x="1524000" y="1122363"/>
-            <a:ext cx="9144000" cy="2387600"/>
+            <a:off x="582930" y="1092225"/>
+            <a:ext cx="6606540" cy="2323489"/>
           </a:xfrm>
         </p:spPr>
         <p:txBody>
           <a:bodyPr anchor="b"/>
           <a:lstStyle>
             <a:lvl1pPr algn="ctr">
-              <a:defRPr sz="6000"/>
+              <a:defRPr sz="5100"/>
             </a:lvl1pPr>
           </a:lstStyle>
           <a:p>
@@ -152,7 +157,7 @@
               <a:rPr lang="en-US" smtClean="0"/>
               <a:t>Click to edit Master title style</a:t>
             </a:r>
-            <a:endParaRPr lang="en-AU"/>
+            <a:endParaRPr lang="en-US" dirty="0"/>
           </a:p>
         </p:txBody>
       </p:sp>
@@ -168,8 +173,8 @@
         </p:nvSpPr>
         <p:spPr>
           <a:xfrm>
-            <a:off x="1524000" y="3602038"/>
-            <a:ext cx="9144000" cy="1655762"/>
+            <a:off x="971550" y="3505316"/>
+            <a:ext cx="5829300" cy="1611302"/>
           </a:xfrm>
         </p:spPr>
         <p:txBody>
@@ -177,39 +182,39 @@
           <a:lstStyle>
             <a:lvl1pPr marL="0" indent="0" algn="ctr">
               <a:buNone/>
-              <a:defRPr sz="2400"/>
+              <a:defRPr sz="2040"/>
             </a:lvl1pPr>
-            <a:lvl2pPr marL="457200" indent="0" algn="ctr">
-              <a:buNone/>
-              <a:defRPr sz="2000"/>
+            <a:lvl2pPr marL="388620" indent="0" algn="ctr">
+              <a:buNone/>
+              <a:defRPr sz="1700"/>
             </a:lvl2pPr>
-            <a:lvl3pPr marL="914400" indent="0" algn="ctr">
-              <a:buNone/>
-              <a:defRPr sz="1800"/>
+            <a:lvl3pPr marL="777240" indent="0" algn="ctr">
+              <a:buNone/>
+              <a:defRPr sz="1530"/>
             </a:lvl3pPr>
-            <a:lvl4pPr marL="1371600" indent="0" algn="ctr">
-              <a:buNone/>
-              <a:defRPr sz="1600"/>
+            <a:lvl4pPr marL="1165860" indent="0" algn="ctr">
+              <a:buNone/>
+              <a:defRPr sz="1360"/>
             </a:lvl4pPr>
-            <a:lvl5pPr marL="1828800" indent="0" algn="ctr">
-              <a:buNone/>
-              <a:defRPr sz="1600"/>
+            <a:lvl5pPr marL="1554480" indent="0" algn="ctr">
+              <a:buNone/>
+              <a:defRPr sz="1360"/>
             </a:lvl5pPr>
-            <a:lvl6pPr marL="2286000" indent="0" algn="ctr">
-              <a:buNone/>
-              <a:defRPr sz="1600"/>
+            <a:lvl6pPr marL="1943100" indent="0" algn="ctr">
+              <a:buNone/>
+              <a:defRPr sz="1360"/>
             </a:lvl6pPr>
-            <a:lvl7pPr marL="2743200" indent="0" algn="ctr">
-              <a:buNone/>
-              <a:defRPr sz="1600"/>
+            <a:lvl7pPr marL="2331720" indent="0" algn="ctr">
+              <a:buNone/>
+              <a:defRPr sz="1360"/>
             </a:lvl7pPr>
-            <a:lvl8pPr marL="3200400" indent="0" algn="ctr">
-              <a:buNone/>
-              <a:defRPr sz="1600"/>
+            <a:lvl8pPr marL="2720340" indent="0" algn="ctr">
+              <a:buNone/>
+              <a:defRPr sz="1360"/>
             </a:lvl8pPr>
-            <a:lvl9pPr marL="3657600" indent="0" algn="ctr">
-              <a:buNone/>
-              <a:defRPr sz="1600"/>
+            <a:lvl9pPr marL="3108960" indent="0" algn="ctr">
+              <a:buNone/>
+              <a:defRPr sz="1360"/>
             </a:lvl9pPr>
           </a:lstStyle>
           <a:p>
@@ -217,7 +222,7 @@
               <a:rPr lang="en-US" smtClean="0"/>
               <a:t>Click to edit Master subtitle style</a:t>
             </a:r>
-            <a:endParaRPr lang="en-AU"/>
+            <a:endParaRPr lang="en-US" dirty="0"/>
           </a:p>
         </p:txBody>
       </p:sp>
@@ -238,7 +243,7 @@
           <a:p>
             <a:fld id="{0383DFF9-AE18-476C-AA8F-471C03CF927A}" type="datetimeFigureOut">
               <a:rPr lang="en-AU" smtClean="0"/>
-              <a:t>24/03/2020</a:t>
+              <a:t>8/05/2020</a:t>
             </a:fld>
             <a:endParaRPr lang="en-AU"/>
           </a:p>
@@ -289,7 +294,7 @@
     </p:spTree>
     <p:extLst>
       <p:ext uri="{BB962C8B-B14F-4D97-AF65-F5344CB8AC3E}">
-        <p14:creationId xmlns:p14="http://schemas.microsoft.com/office/powerpoint/2010/main" val="1603541070"/>
+        <p14:creationId xmlns:p14="http://schemas.microsoft.com/office/powerpoint/2010/main" val="1937334888"/>
       </p:ext>
     </p:extLst>
   </p:cSld>
@@ -335,7 +340,7 @@
               <a:rPr lang="en-US" smtClean="0"/>
               <a:t>Click to edit Master title style</a:t>
             </a:r>
-            <a:endParaRPr lang="en-AU"/>
+            <a:endParaRPr lang="en-US" dirty="0"/>
           </a:p>
         </p:txBody>
       </p:sp>
@@ -387,7 +392,7 @@
               <a:rPr lang="en-US" smtClean="0"/>
               <a:t>Fifth level</a:t>
             </a:r>
-            <a:endParaRPr lang="en-AU"/>
+            <a:endParaRPr lang="en-US" dirty="0"/>
           </a:p>
         </p:txBody>
       </p:sp>
@@ -408,7 +413,7 @@
           <a:p>
             <a:fld id="{0383DFF9-AE18-476C-AA8F-471C03CF927A}" type="datetimeFigureOut">
               <a:rPr lang="en-AU" smtClean="0"/>
-              <a:t>24/03/2020</a:t>
+              <a:t>8/05/2020</a:t>
             </a:fld>
             <a:endParaRPr lang="en-AU"/>
           </a:p>
@@ -459,7 +464,7 @@
     </p:spTree>
     <p:extLst>
       <p:ext uri="{BB962C8B-B14F-4D97-AF65-F5344CB8AC3E}">
-        <p14:creationId xmlns:p14="http://schemas.microsoft.com/office/powerpoint/2010/main" val="2754356596"/>
+        <p14:creationId xmlns:p14="http://schemas.microsoft.com/office/powerpoint/2010/main" val="2194464857"/>
       </p:ext>
     </p:extLst>
   </p:cSld>
@@ -498,8 +503,8 @@
         </p:nvSpPr>
         <p:spPr>
           <a:xfrm>
-            <a:off x="8724900" y="365125"/>
-            <a:ext cx="2628900" cy="5811838"/>
+            <a:off x="5562124" y="355321"/>
+            <a:ext cx="1675924" cy="5655779"/>
           </a:xfrm>
         </p:spPr>
         <p:txBody>
@@ -510,7 +515,7 @@
               <a:rPr lang="en-US" smtClean="0"/>
               <a:t>Click to edit Master title style</a:t>
             </a:r>
-            <a:endParaRPr lang="en-AU"/>
+            <a:endParaRPr lang="en-US" dirty="0"/>
           </a:p>
         </p:txBody>
       </p:sp>
@@ -526,8 +531,8 @@
         </p:nvSpPr>
         <p:spPr>
           <a:xfrm>
-            <a:off x="838200" y="365125"/>
-            <a:ext cx="7734300" cy="5811838"/>
+            <a:off x="534353" y="355321"/>
+            <a:ext cx="4930616" cy="5655779"/>
           </a:xfrm>
         </p:spPr>
         <p:txBody>
@@ -567,7 +572,7 @@
               <a:rPr lang="en-US" smtClean="0"/>
               <a:t>Fifth level</a:t>
             </a:r>
-            <a:endParaRPr lang="en-AU"/>
+            <a:endParaRPr lang="en-US" dirty="0"/>
           </a:p>
         </p:txBody>
       </p:sp>
@@ -588,7 +593,7 @@
           <a:p>
             <a:fld id="{0383DFF9-AE18-476C-AA8F-471C03CF927A}" type="datetimeFigureOut">
               <a:rPr lang="en-AU" smtClean="0"/>
-              <a:t>24/03/2020</a:t>
+              <a:t>8/05/2020</a:t>
             </a:fld>
             <a:endParaRPr lang="en-AU"/>
           </a:p>
@@ -639,7 +644,7 @@
     </p:spTree>
     <p:extLst>
       <p:ext uri="{BB962C8B-B14F-4D97-AF65-F5344CB8AC3E}">
-        <p14:creationId xmlns:p14="http://schemas.microsoft.com/office/powerpoint/2010/main" val="138317264"/>
+        <p14:creationId xmlns:p14="http://schemas.microsoft.com/office/powerpoint/2010/main" val="2732952290"/>
       </p:ext>
     </p:extLst>
   </p:cSld>
@@ -685,7 +690,7 @@
               <a:rPr lang="en-US" smtClean="0"/>
               <a:t>Click to edit Master title style</a:t>
             </a:r>
-            <a:endParaRPr lang="en-AU"/>
+            <a:endParaRPr lang="en-US" dirty="0"/>
           </a:p>
         </p:txBody>
       </p:sp>
@@ -737,7 +742,7 @@
               <a:rPr lang="en-US" smtClean="0"/>
               <a:t>Fifth level</a:t>
             </a:r>
-            <a:endParaRPr lang="en-AU"/>
+            <a:endParaRPr lang="en-US" dirty="0"/>
           </a:p>
         </p:txBody>
       </p:sp>
@@ -758,7 +763,7 @@
           <a:p>
             <a:fld id="{0383DFF9-AE18-476C-AA8F-471C03CF927A}" type="datetimeFigureOut">
               <a:rPr lang="en-AU" smtClean="0"/>
-              <a:t>24/03/2020</a:t>
+              <a:t>8/05/2020</a:t>
             </a:fld>
             <a:endParaRPr lang="en-AU"/>
           </a:p>
@@ -809,7 +814,7 @@
     </p:spTree>
     <p:extLst>
       <p:ext uri="{BB962C8B-B14F-4D97-AF65-F5344CB8AC3E}">
-        <p14:creationId xmlns:p14="http://schemas.microsoft.com/office/powerpoint/2010/main" val="1104119931"/>
+        <p14:creationId xmlns:p14="http://schemas.microsoft.com/office/powerpoint/2010/main" val="4201602585"/>
       </p:ext>
     </p:extLst>
   </p:cSld>
@@ -848,15 +853,15 @@
         </p:nvSpPr>
         <p:spPr>
           <a:xfrm>
-            <a:off x="831850" y="1709738"/>
-            <a:ext cx="10515600" cy="2852737"/>
+            <a:off x="530305" y="1663830"/>
+            <a:ext cx="6703695" cy="2776136"/>
           </a:xfrm>
         </p:spPr>
         <p:txBody>
           <a:bodyPr anchor="b"/>
           <a:lstStyle>
             <a:lvl1pPr>
-              <a:defRPr sz="6000"/>
+              <a:defRPr sz="5100"/>
             </a:lvl1pPr>
           </a:lstStyle>
           <a:p>
@@ -864,7 +869,7 @@
               <a:rPr lang="en-US" smtClean="0"/>
               <a:t>Click to edit Master title style</a:t>
             </a:r>
-            <a:endParaRPr lang="en-AU"/>
+            <a:endParaRPr lang="en-US" dirty="0"/>
           </a:p>
         </p:txBody>
       </p:sp>
@@ -880,8 +885,8 @@
         </p:nvSpPr>
         <p:spPr>
           <a:xfrm>
-            <a:off x="831850" y="4589463"/>
-            <a:ext cx="10515600" cy="1500187"/>
+            <a:off x="530305" y="4466229"/>
+            <a:ext cx="6703695" cy="1459904"/>
           </a:xfrm>
         </p:spPr>
         <p:txBody>
@@ -889,17 +894,15 @@
           <a:lstStyle>
             <a:lvl1pPr marL="0" indent="0">
               <a:buNone/>
-              <a:defRPr sz="2400">
+              <a:defRPr sz="2040">
                 <a:solidFill>
-                  <a:schemeClr val="tx1">
-                    <a:tint val="75000"/>
-                  </a:schemeClr>
+                  <a:schemeClr val="tx1"/>
                 </a:solidFill>
               </a:defRPr>
             </a:lvl1pPr>
-            <a:lvl2pPr marL="457200" indent="0">
-              <a:buNone/>
-              <a:defRPr sz="2000">
+            <a:lvl2pPr marL="388620" indent="0">
+              <a:buNone/>
+              <a:defRPr sz="1700">
                 <a:solidFill>
                   <a:schemeClr val="tx1">
                     <a:tint val="75000"/>
@@ -907,9 +910,9 @@
                 </a:solidFill>
               </a:defRPr>
             </a:lvl2pPr>
-            <a:lvl3pPr marL="914400" indent="0">
-              <a:buNone/>
-              <a:defRPr sz="1800">
+            <a:lvl3pPr marL="777240" indent="0">
+              <a:buNone/>
+              <a:defRPr sz="1530">
                 <a:solidFill>
                   <a:schemeClr val="tx1">
                     <a:tint val="75000"/>
@@ -917,9 +920,9 @@
                 </a:solidFill>
               </a:defRPr>
             </a:lvl3pPr>
-            <a:lvl4pPr marL="1371600" indent="0">
-              <a:buNone/>
-              <a:defRPr sz="1600">
+            <a:lvl4pPr marL="1165860" indent="0">
+              <a:buNone/>
+              <a:defRPr sz="1360">
                 <a:solidFill>
                   <a:schemeClr val="tx1">
                     <a:tint val="75000"/>
@@ -927,9 +930,9 @@
                 </a:solidFill>
               </a:defRPr>
             </a:lvl4pPr>
-            <a:lvl5pPr marL="1828800" indent="0">
-              <a:buNone/>
-              <a:defRPr sz="1600">
+            <a:lvl5pPr marL="1554480" indent="0">
+              <a:buNone/>
+              <a:defRPr sz="1360">
                 <a:solidFill>
                   <a:schemeClr val="tx1">
                     <a:tint val="75000"/>
@@ -937,9 +940,9 @@
                 </a:solidFill>
               </a:defRPr>
             </a:lvl5pPr>
-            <a:lvl6pPr marL="2286000" indent="0">
-              <a:buNone/>
-              <a:defRPr sz="1600">
+            <a:lvl6pPr marL="1943100" indent="0">
+              <a:buNone/>
+              <a:defRPr sz="1360">
                 <a:solidFill>
                   <a:schemeClr val="tx1">
                     <a:tint val="75000"/>
@@ -947,9 +950,9 @@
                 </a:solidFill>
               </a:defRPr>
             </a:lvl6pPr>
-            <a:lvl7pPr marL="2743200" indent="0">
-              <a:buNone/>
-              <a:defRPr sz="1600">
+            <a:lvl7pPr marL="2331720" indent="0">
+              <a:buNone/>
+              <a:defRPr sz="1360">
                 <a:solidFill>
                   <a:schemeClr val="tx1">
                     <a:tint val="75000"/>
@@ -957,9 +960,9 @@
                 </a:solidFill>
               </a:defRPr>
             </a:lvl7pPr>
-            <a:lvl8pPr marL="3200400" indent="0">
-              <a:buNone/>
-              <a:defRPr sz="1600">
+            <a:lvl8pPr marL="2720340" indent="0">
+              <a:buNone/>
+              <a:defRPr sz="1360">
                 <a:solidFill>
                   <a:schemeClr val="tx1">
                     <a:tint val="75000"/>
@@ -967,9 +970,9 @@
                 </a:solidFill>
               </a:defRPr>
             </a:lvl8pPr>
-            <a:lvl9pPr marL="3657600" indent="0">
-              <a:buNone/>
-              <a:defRPr sz="1600">
+            <a:lvl9pPr marL="3108960" indent="0">
+              <a:buNone/>
+              <a:defRPr sz="1360">
                 <a:solidFill>
                   <a:schemeClr val="tx1">
                     <a:tint val="75000"/>
@@ -1004,7 +1007,7 @@
           <a:p>
             <a:fld id="{0383DFF9-AE18-476C-AA8F-471C03CF927A}" type="datetimeFigureOut">
               <a:rPr lang="en-AU" smtClean="0"/>
-              <a:t>24/03/2020</a:t>
+              <a:t>8/05/2020</a:t>
             </a:fld>
             <a:endParaRPr lang="en-AU"/>
           </a:p>
@@ -1055,7 +1058,7 @@
     </p:spTree>
     <p:extLst>
       <p:ext uri="{BB962C8B-B14F-4D97-AF65-F5344CB8AC3E}">
-        <p14:creationId xmlns:p14="http://schemas.microsoft.com/office/powerpoint/2010/main" val="2618808507"/>
+        <p14:creationId xmlns:p14="http://schemas.microsoft.com/office/powerpoint/2010/main" val="3458828192"/>
       </p:ext>
     </p:extLst>
   </p:cSld>
@@ -1101,7 +1104,7 @@
               <a:rPr lang="en-US" smtClean="0"/>
               <a:t>Click to edit Master title style</a:t>
             </a:r>
-            <a:endParaRPr lang="en-AU"/>
+            <a:endParaRPr lang="en-US" dirty="0"/>
           </a:p>
         </p:txBody>
       </p:sp>
@@ -1117,8 +1120,8 @@
         </p:nvSpPr>
         <p:spPr>
           <a:xfrm>
-            <a:off x="838200" y="1825625"/>
-            <a:ext cx="5181600" cy="4351338"/>
+            <a:off x="534353" y="1776603"/>
+            <a:ext cx="3303270" cy="4234497"/>
           </a:xfrm>
         </p:spPr>
         <p:txBody>
@@ -1158,7 +1161,7 @@
               <a:rPr lang="en-US" smtClean="0"/>
               <a:t>Fifth level</a:t>
             </a:r>
-            <a:endParaRPr lang="en-AU"/>
+            <a:endParaRPr lang="en-US" dirty="0"/>
           </a:p>
         </p:txBody>
       </p:sp>
@@ -1174,8 +1177,8 @@
         </p:nvSpPr>
         <p:spPr>
           <a:xfrm>
-            <a:off x="6172200" y="1825625"/>
-            <a:ext cx="5181600" cy="4351338"/>
+            <a:off x="3934778" y="1776603"/>
+            <a:ext cx="3303270" cy="4234497"/>
           </a:xfrm>
         </p:spPr>
         <p:txBody>
@@ -1215,7 +1218,7 @@
               <a:rPr lang="en-US" smtClean="0"/>
               <a:t>Fifth level</a:t>
             </a:r>
-            <a:endParaRPr lang="en-AU"/>
+            <a:endParaRPr lang="en-US" dirty="0"/>
           </a:p>
         </p:txBody>
       </p:sp>
@@ -1236,7 +1239,7 @@
           <a:p>
             <a:fld id="{0383DFF9-AE18-476C-AA8F-471C03CF927A}" type="datetimeFigureOut">
               <a:rPr lang="en-AU" smtClean="0"/>
-              <a:t>24/03/2020</a:t>
+              <a:t>8/05/2020</a:t>
             </a:fld>
             <a:endParaRPr lang="en-AU"/>
           </a:p>
@@ -1287,7 +1290,7 @@
     </p:spTree>
     <p:extLst>
       <p:ext uri="{BB962C8B-B14F-4D97-AF65-F5344CB8AC3E}">
-        <p14:creationId xmlns:p14="http://schemas.microsoft.com/office/powerpoint/2010/main" val="7883963"/>
+        <p14:creationId xmlns:p14="http://schemas.microsoft.com/office/powerpoint/2010/main" val="1592525606"/>
       </p:ext>
     </p:extLst>
   </p:cSld>
@@ -1326,8 +1329,8 @@
         </p:nvSpPr>
         <p:spPr>
           <a:xfrm>
-            <a:off x="839788" y="365125"/>
-            <a:ext cx="10515600" cy="1325563"/>
+            <a:off x="535365" y="355322"/>
+            <a:ext cx="6703695" cy="1289969"/>
           </a:xfrm>
         </p:spPr>
         <p:txBody>
@@ -1338,7 +1341,7 @@
               <a:rPr lang="en-US" smtClean="0"/>
               <a:t>Click to edit Master title style</a:t>
             </a:r>
-            <a:endParaRPr lang="en-AU"/>
+            <a:endParaRPr lang="en-US" dirty="0"/>
           </a:p>
         </p:txBody>
       </p:sp>
@@ -1354,8 +1357,8 @@
         </p:nvSpPr>
         <p:spPr>
           <a:xfrm>
-            <a:off x="839788" y="1681163"/>
-            <a:ext cx="5157787" cy="823912"/>
+            <a:off x="535366" y="1636021"/>
+            <a:ext cx="3288089" cy="801788"/>
           </a:xfrm>
         </p:spPr>
         <p:txBody>
@@ -1363,39 +1366,39 @@
           <a:lstStyle>
             <a:lvl1pPr marL="0" indent="0">
               <a:buNone/>
-              <a:defRPr sz="2400" b="1"/>
+              <a:defRPr sz="2040" b="1"/>
             </a:lvl1pPr>
-            <a:lvl2pPr marL="457200" indent="0">
-              <a:buNone/>
-              <a:defRPr sz="2000" b="1"/>
+            <a:lvl2pPr marL="388620" indent="0">
+              <a:buNone/>
+              <a:defRPr sz="1700" b="1"/>
             </a:lvl2pPr>
-            <a:lvl3pPr marL="914400" indent="0">
-              <a:buNone/>
-              <a:defRPr sz="1800" b="1"/>
+            <a:lvl3pPr marL="777240" indent="0">
+              <a:buNone/>
+              <a:defRPr sz="1530" b="1"/>
             </a:lvl3pPr>
-            <a:lvl4pPr marL="1371600" indent="0">
-              <a:buNone/>
-              <a:defRPr sz="1600" b="1"/>
+            <a:lvl4pPr marL="1165860" indent="0">
+              <a:buNone/>
+              <a:defRPr sz="1360" b="1"/>
             </a:lvl4pPr>
-            <a:lvl5pPr marL="1828800" indent="0">
-              <a:buNone/>
-              <a:defRPr sz="1600" b="1"/>
+            <a:lvl5pPr marL="1554480" indent="0">
+              <a:buNone/>
+              <a:defRPr sz="1360" b="1"/>
             </a:lvl5pPr>
-            <a:lvl6pPr marL="2286000" indent="0">
-              <a:buNone/>
-              <a:defRPr sz="1600" b="1"/>
+            <a:lvl6pPr marL="1943100" indent="0">
+              <a:buNone/>
+              <a:defRPr sz="1360" b="1"/>
             </a:lvl6pPr>
-            <a:lvl7pPr marL="2743200" indent="0">
-              <a:buNone/>
-              <a:defRPr sz="1600" b="1"/>
+            <a:lvl7pPr marL="2331720" indent="0">
+              <a:buNone/>
+              <a:defRPr sz="1360" b="1"/>
             </a:lvl7pPr>
-            <a:lvl8pPr marL="3200400" indent="0">
-              <a:buNone/>
-              <a:defRPr sz="1600" b="1"/>
+            <a:lvl8pPr marL="2720340" indent="0">
+              <a:buNone/>
+              <a:defRPr sz="1360" b="1"/>
             </a:lvl8pPr>
-            <a:lvl9pPr marL="3657600" indent="0">
-              <a:buNone/>
-              <a:defRPr sz="1600" b="1"/>
+            <a:lvl9pPr marL="3108960" indent="0">
+              <a:buNone/>
+              <a:defRPr sz="1360" b="1"/>
             </a:lvl9pPr>
           </a:lstStyle>
           <a:p>
@@ -1419,8 +1422,8 @@
         </p:nvSpPr>
         <p:spPr>
           <a:xfrm>
-            <a:off x="839788" y="2505075"/>
-            <a:ext cx="5157787" cy="3684588"/>
+            <a:off x="535366" y="2437809"/>
+            <a:ext cx="3288089" cy="3585650"/>
           </a:xfrm>
         </p:spPr>
         <p:txBody>
@@ -1460,7 +1463,7 @@
               <a:rPr lang="en-US" smtClean="0"/>
               <a:t>Fifth level</a:t>
             </a:r>
-            <a:endParaRPr lang="en-AU"/>
+            <a:endParaRPr lang="en-US" dirty="0"/>
           </a:p>
         </p:txBody>
       </p:sp>
@@ -1476,8 +1479,8 @@
         </p:nvSpPr>
         <p:spPr>
           <a:xfrm>
-            <a:off x="6172200" y="1681163"/>
-            <a:ext cx="5183188" cy="823912"/>
+            <a:off x="3934778" y="1636021"/>
+            <a:ext cx="3304282" cy="801788"/>
           </a:xfrm>
         </p:spPr>
         <p:txBody>
@@ -1485,39 +1488,39 @@
           <a:lstStyle>
             <a:lvl1pPr marL="0" indent="0">
               <a:buNone/>
-              <a:defRPr sz="2400" b="1"/>
+              <a:defRPr sz="2040" b="1"/>
             </a:lvl1pPr>
-            <a:lvl2pPr marL="457200" indent="0">
-              <a:buNone/>
-              <a:defRPr sz="2000" b="1"/>
+            <a:lvl2pPr marL="388620" indent="0">
+              <a:buNone/>
+              <a:defRPr sz="1700" b="1"/>
             </a:lvl2pPr>
-            <a:lvl3pPr marL="914400" indent="0">
-              <a:buNone/>
-              <a:defRPr sz="1800" b="1"/>
+            <a:lvl3pPr marL="777240" indent="0">
+              <a:buNone/>
+              <a:defRPr sz="1530" b="1"/>
             </a:lvl3pPr>
-            <a:lvl4pPr marL="1371600" indent="0">
-              <a:buNone/>
-              <a:defRPr sz="1600" b="1"/>
+            <a:lvl4pPr marL="1165860" indent="0">
+              <a:buNone/>
+              <a:defRPr sz="1360" b="1"/>
             </a:lvl4pPr>
-            <a:lvl5pPr marL="1828800" indent="0">
-              <a:buNone/>
-              <a:defRPr sz="1600" b="1"/>
+            <a:lvl5pPr marL="1554480" indent="0">
+              <a:buNone/>
+              <a:defRPr sz="1360" b="1"/>
             </a:lvl5pPr>
-            <a:lvl6pPr marL="2286000" indent="0">
-              <a:buNone/>
-              <a:defRPr sz="1600" b="1"/>
+            <a:lvl6pPr marL="1943100" indent="0">
+              <a:buNone/>
+              <a:defRPr sz="1360" b="1"/>
             </a:lvl6pPr>
-            <a:lvl7pPr marL="2743200" indent="0">
-              <a:buNone/>
-              <a:defRPr sz="1600" b="1"/>
+            <a:lvl7pPr marL="2331720" indent="0">
+              <a:buNone/>
+              <a:defRPr sz="1360" b="1"/>
             </a:lvl7pPr>
-            <a:lvl8pPr marL="3200400" indent="0">
-              <a:buNone/>
-              <a:defRPr sz="1600" b="1"/>
+            <a:lvl8pPr marL="2720340" indent="0">
+              <a:buNone/>
+              <a:defRPr sz="1360" b="1"/>
             </a:lvl8pPr>
-            <a:lvl9pPr marL="3657600" indent="0">
-              <a:buNone/>
-              <a:defRPr sz="1600" b="1"/>
+            <a:lvl9pPr marL="3108960" indent="0">
+              <a:buNone/>
+              <a:defRPr sz="1360" b="1"/>
             </a:lvl9pPr>
           </a:lstStyle>
           <a:p>
@@ -1541,8 +1544,8 @@
         </p:nvSpPr>
         <p:spPr>
           <a:xfrm>
-            <a:off x="6172200" y="2505075"/>
-            <a:ext cx="5183188" cy="3684588"/>
+            <a:off x="3934778" y="2437809"/>
+            <a:ext cx="3304282" cy="3585650"/>
           </a:xfrm>
         </p:spPr>
         <p:txBody>
@@ -1582,7 +1585,7 @@
               <a:rPr lang="en-US" smtClean="0"/>
               <a:t>Fifth level</a:t>
             </a:r>
-            <a:endParaRPr lang="en-AU"/>
+            <a:endParaRPr lang="en-US" dirty="0"/>
           </a:p>
         </p:txBody>
       </p:sp>
@@ -1603,7 +1606,7 @@
           <a:p>
             <a:fld id="{0383DFF9-AE18-476C-AA8F-471C03CF927A}" type="datetimeFigureOut">
               <a:rPr lang="en-AU" smtClean="0"/>
-              <a:t>24/03/2020</a:t>
+              <a:t>8/05/2020</a:t>
             </a:fld>
             <a:endParaRPr lang="en-AU"/>
           </a:p>
@@ -1654,7 +1657,7 @@
     </p:spTree>
     <p:extLst>
       <p:ext uri="{BB962C8B-B14F-4D97-AF65-F5344CB8AC3E}">
-        <p14:creationId xmlns:p14="http://schemas.microsoft.com/office/powerpoint/2010/main" val="1175277060"/>
+        <p14:creationId xmlns:p14="http://schemas.microsoft.com/office/powerpoint/2010/main" val="1012364541"/>
       </p:ext>
     </p:extLst>
   </p:cSld>
@@ -1700,7 +1703,7 @@
               <a:rPr lang="en-US" smtClean="0"/>
               <a:t>Click to edit Master title style</a:t>
             </a:r>
-            <a:endParaRPr lang="en-AU"/>
+            <a:endParaRPr lang="en-US" dirty="0"/>
           </a:p>
         </p:txBody>
       </p:sp>
@@ -1721,7 +1724,7 @@
           <a:p>
             <a:fld id="{0383DFF9-AE18-476C-AA8F-471C03CF927A}" type="datetimeFigureOut">
               <a:rPr lang="en-AU" smtClean="0"/>
-              <a:t>24/03/2020</a:t>
+              <a:t>8/05/2020</a:t>
             </a:fld>
             <a:endParaRPr lang="en-AU"/>
           </a:p>
@@ -1772,7 +1775,7 @@
     </p:spTree>
     <p:extLst>
       <p:ext uri="{BB962C8B-B14F-4D97-AF65-F5344CB8AC3E}">
-        <p14:creationId xmlns:p14="http://schemas.microsoft.com/office/powerpoint/2010/main" val="3828666193"/>
+        <p14:creationId xmlns:p14="http://schemas.microsoft.com/office/powerpoint/2010/main" val="2192694842"/>
       </p:ext>
     </p:extLst>
   </p:cSld>
@@ -1816,7 +1819,7 @@
           <a:p>
             <a:fld id="{0383DFF9-AE18-476C-AA8F-471C03CF927A}" type="datetimeFigureOut">
               <a:rPr lang="en-AU" smtClean="0"/>
-              <a:t>24/03/2020</a:t>
+              <a:t>8/05/2020</a:t>
             </a:fld>
             <a:endParaRPr lang="en-AU"/>
           </a:p>
@@ -1867,7 +1870,7 @@
     </p:spTree>
     <p:extLst>
       <p:ext uri="{BB962C8B-B14F-4D97-AF65-F5344CB8AC3E}">
-        <p14:creationId xmlns:p14="http://schemas.microsoft.com/office/powerpoint/2010/main" val="1407156521"/>
+        <p14:creationId xmlns:p14="http://schemas.microsoft.com/office/powerpoint/2010/main" val="1102303917"/>
       </p:ext>
     </p:extLst>
   </p:cSld>
@@ -1906,15 +1909,15 @@
         </p:nvSpPr>
         <p:spPr>
           <a:xfrm>
-            <a:off x="839788" y="457200"/>
-            <a:ext cx="3932237" cy="1600200"/>
+            <a:off x="535365" y="444923"/>
+            <a:ext cx="2506801" cy="1557232"/>
           </a:xfrm>
         </p:spPr>
         <p:txBody>
           <a:bodyPr anchor="b"/>
           <a:lstStyle>
             <a:lvl1pPr>
-              <a:defRPr sz="3200"/>
+              <a:defRPr sz="2720"/>
             </a:lvl1pPr>
           </a:lstStyle>
           <a:p>
@@ -1922,7 +1925,7 @@
               <a:rPr lang="en-US" smtClean="0"/>
               <a:t>Click to edit Master title style</a:t>
             </a:r>
-            <a:endParaRPr lang="en-AU"/>
+            <a:endParaRPr lang="en-US" dirty="0"/>
           </a:p>
         </p:txBody>
       </p:sp>
@@ -1938,39 +1941,39 @@
         </p:nvSpPr>
         <p:spPr>
           <a:xfrm>
-            <a:off x="5183188" y="987425"/>
-            <a:ext cx="6172200" cy="4873625"/>
+            <a:off x="3304282" y="960912"/>
+            <a:ext cx="3934778" cy="4742759"/>
           </a:xfrm>
         </p:spPr>
         <p:txBody>
           <a:bodyPr/>
           <a:lstStyle>
             <a:lvl1pPr>
-              <a:defRPr sz="3200"/>
+              <a:defRPr sz="2720"/>
             </a:lvl1pPr>
             <a:lvl2pPr>
-              <a:defRPr sz="2800"/>
+              <a:defRPr sz="2380"/>
             </a:lvl2pPr>
             <a:lvl3pPr>
-              <a:defRPr sz="2400"/>
+              <a:defRPr sz="2040"/>
             </a:lvl3pPr>
             <a:lvl4pPr>
-              <a:defRPr sz="2000"/>
+              <a:defRPr sz="1700"/>
             </a:lvl4pPr>
             <a:lvl5pPr>
-              <a:defRPr sz="2000"/>
+              <a:defRPr sz="1700"/>
             </a:lvl5pPr>
             <a:lvl6pPr>
-              <a:defRPr sz="2000"/>
+              <a:defRPr sz="1700"/>
             </a:lvl6pPr>
             <a:lvl7pPr>
-              <a:defRPr sz="2000"/>
+              <a:defRPr sz="1700"/>
             </a:lvl7pPr>
             <a:lvl8pPr>
-              <a:defRPr sz="2000"/>
+              <a:defRPr sz="1700"/>
             </a:lvl8pPr>
             <a:lvl9pPr>
-              <a:defRPr sz="2000"/>
+              <a:defRPr sz="1700"/>
             </a:lvl9pPr>
           </a:lstStyle>
           <a:p>
@@ -2007,7 +2010,7 @@
               <a:rPr lang="en-US" smtClean="0"/>
               <a:t>Fifth level</a:t>
             </a:r>
-            <a:endParaRPr lang="en-AU"/>
+            <a:endParaRPr lang="en-US" dirty="0"/>
           </a:p>
         </p:txBody>
       </p:sp>
@@ -2023,8 +2026,8 @@
         </p:nvSpPr>
         <p:spPr>
           <a:xfrm>
-            <a:off x="839788" y="2057400"/>
-            <a:ext cx="3932237" cy="3811588"/>
+            <a:off x="535365" y="2002155"/>
+            <a:ext cx="2506801" cy="3709240"/>
           </a:xfrm>
         </p:spPr>
         <p:txBody>
@@ -2032,39 +2035,39 @@
           <a:lstStyle>
             <a:lvl1pPr marL="0" indent="0">
               <a:buNone/>
-              <a:defRPr sz="1600"/>
+              <a:defRPr sz="1360"/>
             </a:lvl1pPr>
-            <a:lvl2pPr marL="457200" indent="0">
-              <a:buNone/>
-              <a:defRPr sz="1400"/>
+            <a:lvl2pPr marL="388620" indent="0">
+              <a:buNone/>
+              <a:defRPr sz="1190"/>
             </a:lvl2pPr>
-            <a:lvl3pPr marL="914400" indent="0">
-              <a:buNone/>
-              <a:defRPr sz="1200"/>
+            <a:lvl3pPr marL="777240" indent="0">
+              <a:buNone/>
+              <a:defRPr sz="1020"/>
             </a:lvl3pPr>
-            <a:lvl4pPr marL="1371600" indent="0">
-              <a:buNone/>
-              <a:defRPr sz="1000"/>
+            <a:lvl4pPr marL="1165860" indent="0">
+              <a:buNone/>
+              <a:defRPr sz="850"/>
             </a:lvl4pPr>
-            <a:lvl5pPr marL="1828800" indent="0">
-              <a:buNone/>
-              <a:defRPr sz="1000"/>
+            <a:lvl5pPr marL="1554480" indent="0">
+              <a:buNone/>
+              <a:defRPr sz="850"/>
             </a:lvl5pPr>
-            <a:lvl6pPr marL="2286000" indent="0">
-              <a:buNone/>
-              <a:defRPr sz="1000"/>
+            <a:lvl6pPr marL="1943100" indent="0">
+              <a:buNone/>
+              <a:defRPr sz="850"/>
             </a:lvl6pPr>
-            <a:lvl7pPr marL="2743200" indent="0">
-              <a:buNone/>
-              <a:defRPr sz="1000"/>
+            <a:lvl7pPr marL="2331720" indent="0">
+              <a:buNone/>
+              <a:defRPr sz="850"/>
             </a:lvl7pPr>
-            <a:lvl8pPr marL="3200400" indent="0">
-              <a:buNone/>
-              <a:defRPr sz="1000"/>
+            <a:lvl8pPr marL="2720340" indent="0">
+              <a:buNone/>
+              <a:defRPr sz="850"/>
             </a:lvl8pPr>
-            <a:lvl9pPr marL="3657600" indent="0">
-              <a:buNone/>
-              <a:defRPr sz="1000"/>
+            <a:lvl9pPr marL="3108960" indent="0">
+              <a:buNone/>
+              <a:defRPr sz="850"/>
             </a:lvl9pPr>
           </a:lstStyle>
           <a:p>
@@ -2093,7 +2096,7 @@
           <a:p>
             <a:fld id="{0383DFF9-AE18-476C-AA8F-471C03CF927A}" type="datetimeFigureOut">
               <a:rPr lang="en-AU" smtClean="0"/>
-              <a:t>24/03/2020</a:t>
+              <a:t>8/05/2020</a:t>
             </a:fld>
             <a:endParaRPr lang="en-AU"/>
           </a:p>
@@ -2144,7 +2147,7 @@
     </p:spTree>
     <p:extLst>
       <p:ext uri="{BB962C8B-B14F-4D97-AF65-F5344CB8AC3E}">
-        <p14:creationId xmlns:p14="http://schemas.microsoft.com/office/powerpoint/2010/main" val="879064278"/>
+        <p14:creationId xmlns:p14="http://schemas.microsoft.com/office/powerpoint/2010/main" val="3934396074"/>
       </p:ext>
     </p:extLst>
   </p:cSld>
@@ -2183,15 +2186,15 @@
         </p:nvSpPr>
         <p:spPr>
           <a:xfrm>
-            <a:off x="839788" y="457200"/>
-            <a:ext cx="3932237" cy="1600200"/>
+            <a:off x="535365" y="444923"/>
+            <a:ext cx="2506801" cy="1557232"/>
           </a:xfrm>
         </p:spPr>
         <p:txBody>
           <a:bodyPr anchor="b"/>
           <a:lstStyle>
             <a:lvl1pPr>
-              <a:defRPr sz="3200"/>
+              <a:defRPr sz="2720"/>
             </a:lvl1pPr>
           </a:lstStyle>
           <a:p>
@@ -2199,7 +2202,7 @@
               <a:rPr lang="en-US" smtClean="0"/>
               <a:t>Click to edit Master title style</a:t>
             </a:r>
-            <a:endParaRPr lang="en-AU"/>
+            <a:endParaRPr lang="en-US" dirty="0"/>
           </a:p>
         </p:txBody>
       </p:sp>
@@ -2207,7 +2210,7 @@
         <p:nvSpPr>
           <p:cNvPr id="3" name="Picture Placeholder 2"/>
           <p:cNvSpPr>
-            <a:spLocks noGrp="1"/>
+            <a:spLocks noGrp="1" noChangeAspect="1"/>
           </p:cNvSpPr>
           <p:nvPr>
             <p:ph type="pic" idx="1"/>
@@ -2215,52 +2218,56 @@
         </p:nvSpPr>
         <p:spPr>
           <a:xfrm>
-            <a:off x="5183188" y="987425"/>
-            <a:ext cx="6172200" cy="4873625"/>
+            <a:off x="3304282" y="960912"/>
+            <a:ext cx="3934778" cy="4742759"/>
           </a:xfrm>
         </p:spPr>
         <p:txBody>
-          <a:bodyPr/>
+          <a:bodyPr anchor="t"/>
           <a:lstStyle>
             <a:lvl1pPr marL="0" indent="0">
               <a:buNone/>
-              <a:defRPr sz="3200"/>
+              <a:defRPr sz="2720"/>
             </a:lvl1pPr>
-            <a:lvl2pPr marL="457200" indent="0">
-              <a:buNone/>
-              <a:defRPr sz="2800"/>
+            <a:lvl2pPr marL="388620" indent="0">
+              <a:buNone/>
+              <a:defRPr sz="2380"/>
             </a:lvl2pPr>
-            <a:lvl3pPr marL="914400" indent="0">
-              <a:buNone/>
-              <a:defRPr sz="2400"/>
+            <a:lvl3pPr marL="777240" indent="0">
+              <a:buNone/>
+              <a:defRPr sz="2040"/>
             </a:lvl3pPr>
-            <a:lvl4pPr marL="1371600" indent="0">
-              <a:buNone/>
-              <a:defRPr sz="2000"/>
+            <a:lvl4pPr marL="1165860" indent="0">
+              <a:buNone/>
+              <a:defRPr sz="1700"/>
             </a:lvl4pPr>
-            <a:lvl5pPr marL="1828800" indent="0">
-              <a:buNone/>
-              <a:defRPr sz="2000"/>
+            <a:lvl5pPr marL="1554480" indent="0">
+              <a:buNone/>
+              <a:defRPr sz="1700"/>
             </a:lvl5pPr>
-            <a:lvl6pPr marL="2286000" indent="0">
-              <a:buNone/>
-              <a:defRPr sz="2000"/>
+            <a:lvl6pPr marL="1943100" indent="0">
+              <a:buNone/>
+              <a:defRPr sz="1700"/>
             </a:lvl6pPr>
-            <a:lvl7pPr marL="2743200" indent="0">
-              <a:buNone/>
-              <a:defRPr sz="2000"/>
+            <a:lvl7pPr marL="2331720" indent="0">
+              <a:buNone/>
+              <a:defRPr sz="1700"/>
             </a:lvl7pPr>
-            <a:lvl8pPr marL="3200400" indent="0">
-              <a:buNone/>
-              <a:defRPr sz="2000"/>
+            <a:lvl8pPr marL="2720340" indent="0">
+              <a:buNone/>
+              <a:defRPr sz="1700"/>
             </a:lvl8pPr>
-            <a:lvl9pPr marL="3657600" indent="0">
-              <a:buNone/>
-              <a:defRPr sz="2000"/>
+            <a:lvl9pPr marL="3108960" indent="0">
+              <a:buNone/>
+              <a:defRPr sz="1700"/>
             </a:lvl9pPr>
           </a:lstStyle>
           <a:p>
-            <a:endParaRPr lang="en-AU"/>
+            <a:r>
+              <a:rPr lang="en-US" smtClean="0"/>
+              <a:t>Click icon to add picture</a:t>
+            </a:r>
+            <a:endParaRPr lang="en-US" dirty="0"/>
           </a:p>
         </p:txBody>
       </p:sp>
@@ -2276,8 +2283,8 @@
         </p:nvSpPr>
         <p:spPr>
           <a:xfrm>
-            <a:off x="839788" y="2057400"/>
-            <a:ext cx="3932237" cy="3811588"/>
+            <a:off x="535365" y="2002155"/>
+            <a:ext cx="2506801" cy="3709240"/>
           </a:xfrm>
         </p:spPr>
         <p:txBody>
@@ -2285,39 +2292,39 @@
           <a:lstStyle>
             <a:lvl1pPr marL="0" indent="0">
               <a:buNone/>
-              <a:defRPr sz="1600"/>
+              <a:defRPr sz="1360"/>
             </a:lvl1pPr>
-            <a:lvl2pPr marL="457200" indent="0">
-              <a:buNone/>
-              <a:defRPr sz="1400"/>
+            <a:lvl2pPr marL="388620" indent="0">
+              <a:buNone/>
+              <a:defRPr sz="1190"/>
             </a:lvl2pPr>
-            <a:lvl3pPr marL="914400" indent="0">
-              <a:buNone/>
-              <a:defRPr sz="1200"/>
+            <a:lvl3pPr marL="777240" indent="0">
+              <a:buNone/>
+              <a:defRPr sz="1020"/>
             </a:lvl3pPr>
-            <a:lvl4pPr marL="1371600" indent="0">
-              <a:buNone/>
-              <a:defRPr sz="1000"/>
+            <a:lvl4pPr marL="1165860" indent="0">
+              <a:buNone/>
+              <a:defRPr sz="850"/>
             </a:lvl4pPr>
-            <a:lvl5pPr marL="1828800" indent="0">
-              <a:buNone/>
-              <a:defRPr sz="1000"/>
+            <a:lvl5pPr marL="1554480" indent="0">
+              <a:buNone/>
+              <a:defRPr sz="850"/>
             </a:lvl5pPr>
-            <a:lvl6pPr marL="2286000" indent="0">
-              <a:buNone/>
-              <a:defRPr sz="1000"/>
+            <a:lvl6pPr marL="1943100" indent="0">
+              <a:buNone/>
+              <a:defRPr sz="850"/>
             </a:lvl6pPr>
-            <a:lvl7pPr marL="2743200" indent="0">
-              <a:buNone/>
-              <a:defRPr sz="1000"/>
+            <a:lvl7pPr marL="2331720" indent="0">
+              <a:buNone/>
+              <a:defRPr sz="850"/>
             </a:lvl7pPr>
-            <a:lvl8pPr marL="3200400" indent="0">
-              <a:buNone/>
-              <a:defRPr sz="1000"/>
+            <a:lvl8pPr marL="2720340" indent="0">
+              <a:buNone/>
+              <a:defRPr sz="850"/>
             </a:lvl8pPr>
-            <a:lvl9pPr marL="3657600" indent="0">
-              <a:buNone/>
-              <a:defRPr sz="1000"/>
+            <a:lvl9pPr marL="3108960" indent="0">
+              <a:buNone/>
+              <a:defRPr sz="850"/>
             </a:lvl9pPr>
           </a:lstStyle>
           <a:p>
@@ -2346,7 +2353,7 @@
           <a:p>
             <a:fld id="{0383DFF9-AE18-476C-AA8F-471C03CF927A}" type="datetimeFigureOut">
               <a:rPr lang="en-AU" smtClean="0"/>
-              <a:t>24/03/2020</a:t>
+              <a:t>8/05/2020</a:t>
             </a:fld>
             <a:endParaRPr lang="en-AU"/>
           </a:p>
@@ -2397,7 +2404,7 @@
     </p:spTree>
     <p:extLst>
       <p:ext uri="{BB962C8B-B14F-4D97-AF65-F5344CB8AC3E}">
-        <p14:creationId xmlns:p14="http://schemas.microsoft.com/office/powerpoint/2010/main" val="759048153"/>
+        <p14:creationId xmlns:p14="http://schemas.microsoft.com/office/powerpoint/2010/main" val="660540214"/>
       </p:ext>
     </p:extLst>
   </p:cSld>
@@ -2441,8 +2448,8 @@
         </p:nvSpPr>
         <p:spPr>
           <a:xfrm>
-            <a:off x="838200" y="365125"/>
-            <a:ext cx="10515600" cy="1325563"/>
+            <a:off x="534353" y="355322"/>
+            <a:ext cx="6703695" cy="1289969"/>
           </a:xfrm>
           <a:prstGeom prst="rect">
             <a:avLst/>
@@ -2458,7 +2465,7 @@
               <a:rPr lang="en-US" smtClean="0"/>
               <a:t>Click to edit Master title style</a:t>
             </a:r>
-            <a:endParaRPr lang="en-AU"/>
+            <a:endParaRPr lang="en-US" dirty="0"/>
           </a:p>
         </p:txBody>
       </p:sp>
@@ -2474,8 +2481,8 @@
         </p:nvSpPr>
         <p:spPr>
           <a:xfrm>
-            <a:off x="838200" y="1825625"/>
-            <a:ext cx="10515600" cy="4351338"/>
+            <a:off x="534353" y="1776603"/>
+            <a:ext cx="6703695" cy="4234497"/>
           </a:xfrm>
           <a:prstGeom prst="rect">
             <a:avLst/>
@@ -2520,7 +2527,7 @@
               <a:rPr lang="en-US" smtClean="0"/>
               <a:t>Fifth level</a:t>
             </a:r>
-            <a:endParaRPr lang="en-AU"/>
+            <a:endParaRPr lang="en-US" dirty="0"/>
           </a:p>
         </p:txBody>
       </p:sp>
@@ -2536,8 +2543,8 @@
         </p:nvSpPr>
         <p:spPr>
           <a:xfrm>
-            <a:off x="838200" y="6356350"/>
-            <a:ext cx="2743200" cy="365125"/>
+            <a:off x="534353" y="6185672"/>
+            <a:ext cx="1748790" cy="355321"/>
           </a:xfrm>
           <a:prstGeom prst="rect">
             <a:avLst/>
@@ -2547,7 +2554,7 @@
           <a:bodyPr vert="horz" lIns="91440" tIns="45720" rIns="91440" bIns="45720" rtlCol="0" anchor="ctr"/>
           <a:lstStyle>
             <a:lvl1pPr algn="l">
-              <a:defRPr sz="1200">
+              <a:defRPr sz="1020">
                 <a:solidFill>
                   <a:schemeClr val="tx1">
                     <a:tint val="75000"/>
@@ -2559,7 +2566,7 @@
           <a:p>
             <a:fld id="{0383DFF9-AE18-476C-AA8F-471C03CF927A}" type="datetimeFigureOut">
               <a:rPr lang="en-AU" smtClean="0"/>
-              <a:t>24/03/2020</a:t>
+              <a:t>8/05/2020</a:t>
             </a:fld>
             <a:endParaRPr lang="en-AU"/>
           </a:p>
@@ -2577,8 +2584,8 @@
         </p:nvSpPr>
         <p:spPr>
           <a:xfrm>
-            <a:off x="4038600" y="6356350"/>
-            <a:ext cx="4114800" cy="365125"/>
+            <a:off x="2574608" y="6185672"/>
+            <a:ext cx="2623185" cy="355321"/>
           </a:xfrm>
           <a:prstGeom prst="rect">
             <a:avLst/>
@@ -2588,7 +2595,7 @@
           <a:bodyPr vert="horz" lIns="91440" tIns="45720" rIns="91440" bIns="45720" rtlCol="0" anchor="ctr"/>
           <a:lstStyle>
             <a:lvl1pPr algn="ctr">
-              <a:defRPr sz="1200">
+              <a:defRPr sz="1020">
                 <a:solidFill>
                   <a:schemeClr val="tx1">
                     <a:tint val="75000"/>
@@ -2614,8 +2621,8 @@
         </p:nvSpPr>
         <p:spPr>
           <a:xfrm>
-            <a:off x="8610600" y="6356350"/>
-            <a:ext cx="2743200" cy="365125"/>
+            <a:off x="5489258" y="6185672"/>
+            <a:ext cx="1748790" cy="355321"/>
           </a:xfrm>
           <a:prstGeom prst="rect">
             <a:avLst/>
@@ -2625,7 +2632,7 @@
           <a:bodyPr vert="horz" lIns="91440" tIns="45720" rIns="91440" bIns="45720" rtlCol="0" anchor="ctr"/>
           <a:lstStyle>
             <a:lvl1pPr algn="r">
-              <a:defRPr sz="1200">
+              <a:defRPr sz="1020">
                 <a:solidFill>
                   <a:schemeClr val="tx1">
                     <a:tint val="75000"/>
@@ -2646,27 +2653,27 @@
     </p:spTree>
     <p:extLst>
       <p:ext uri="{BB962C8B-B14F-4D97-AF65-F5344CB8AC3E}">
-        <p14:creationId xmlns:p14="http://schemas.microsoft.com/office/powerpoint/2010/main" val="961770183"/>
+        <p14:creationId xmlns:p14="http://schemas.microsoft.com/office/powerpoint/2010/main" val="1874491968"/>
       </p:ext>
     </p:extLst>
   </p:cSld>
   <p:clrMap bg1="lt1" tx1="dk1" bg2="lt2" tx2="dk2" accent1="accent1" accent2="accent2" accent3="accent3" accent4="accent4" accent5="accent5" accent6="accent6" hlink="hlink" folHlink="folHlink"/>
   <p:sldLayoutIdLst>
-    <p:sldLayoutId id="2147483649" r:id="rId1"/>
-    <p:sldLayoutId id="2147483650" r:id="rId2"/>
-    <p:sldLayoutId id="2147483651" r:id="rId3"/>
-    <p:sldLayoutId id="2147483652" r:id="rId4"/>
-    <p:sldLayoutId id="2147483653" r:id="rId5"/>
-    <p:sldLayoutId id="2147483654" r:id="rId6"/>
-    <p:sldLayoutId id="2147483655" r:id="rId7"/>
-    <p:sldLayoutId id="2147483656" r:id="rId8"/>
-    <p:sldLayoutId id="2147483657" r:id="rId9"/>
-    <p:sldLayoutId id="2147483658" r:id="rId10"/>
-    <p:sldLayoutId id="2147483659" r:id="rId11"/>
+    <p:sldLayoutId id="2147483661" r:id="rId1"/>
+    <p:sldLayoutId id="2147483662" r:id="rId2"/>
+    <p:sldLayoutId id="2147483663" r:id="rId3"/>
+    <p:sldLayoutId id="2147483664" r:id="rId4"/>
+    <p:sldLayoutId id="2147483665" r:id="rId5"/>
+    <p:sldLayoutId id="2147483666" r:id="rId6"/>
+    <p:sldLayoutId id="2147483667" r:id="rId7"/>
+    <p:sldLayoutId id="2147483668" r:id="rId8"/>
+    <p:sldLayoutId id="2147483669" r:id="rId9"/>
+    <p:sldLayoutId id="2147483670" r:id="rId10"/>
+    <p:sldLayoutId id="2147483671" r:id="rId11"/>
   </p:sldLayoutIdLst>
   <p:txStyles>
     <p:titleStyle>
-      <a:lvl1pPr algn="l" defTabSz="914400" rtl="0" eaLnBrk="1" latinLnBrk="0" hangingPunct="1">
+      <a:lvl1pPr algn="l" defTabSz="777240" rtl="0" eaLnBrk="1" latinLnBrk="0" hangingPunct="1">
         <a:lnSpc>
           <a:spcPct val="90000"/>
         </a:lnSpc>
@@ -2674,7 +2681,7 @@
           <a:spcPct val="0"/>
         </a:spcBef>
         <a:buNone/>
-        <a:defRPr sz="4400" kern="1200">
+        <a:defRPr sz="3740" kern="1200">
           <a:solidFill>
             <a:schemeClr val="tx1"/>
           </a:solidFill>
@@ -2685,16 +2692,16 @@
       </a:lvl1pPr>
     </p:titleStyle>
     <p:bodyStyle>
-      <a:lvl1pPr marL="228600" indent="-228600" algn="l" defTabSz="914400" rtl="0" eaLnBrk="1" latinLnBrk="0" hangingPunct="1">
+      <a:lvl1pPr marL="194310" indent="-194310" algn="l" defTabSz="777240" rtl="0" eaLnBrk="1" latinLnBrk="0" hangingPunct="1">
         <a:lnSpc>
           <a:spcPct val="90000"/>
         </a:lnSpc>
         <a:spcBef>
-          <a:spcPts val="1000"/>
+          <a:spcPts val="850"/>
         </a:spcBef>
         <a:buFont typeface="Arial" panose="020B0604020202020204" pitchFamily="34" charset="0"/>
         <a:buChar char="•"/>
-        <a:defRPr sz="2800" kern="1200">
+        <a:defRPr sz="2380" kern="1200">
           <a:solidFill>
             <a:schemeClr val="tx1"/>
           </a:solidFill>
@@ -2703,16 +2710,16 @@
           <a:cs typeface="+mn-cs"/>
         </a:defRPr>
       </a:lvl1pPr>
-      <a:lvl2pPr marL="685800" indent="-228600" algn="l" defTabSz="914400" rtl="0" eaLnBrk="1" latinLnBrk="0" hangingPunct="1">
+      <a:lvl2pPr marL="582930" indent="-194310" algn="l" defTabSz="777240" rtl="0" eaLnBrk="1" latinLnBrk="0" hangingPunct="1">
         <a:lnSpc>
           <a:spcPct val="90000"/>
         </a:lnSpc>
         <a:spcBef>
-          <a:spcPts val="500"/>
+          <a:spcPts val="425"/>
         </a:spcBef>
         <a:buFont typeface="Arial" panose="020B0604020202020204" pitchFamily="34" charset="0"/>
         <a:buChar char="•"/>
-        <a:defRPr sz="2400" kern="1200">
+        <a:defRPr sz="2040" kern="1200">
           <a:solidFill>
             <a:schemeClr val="tx1"/>
           </a:solidFill>
@@ -2721,16 +2728,16 @@
           <a:cs typeface="+mn-cs"/>
         </a:defRPr>
       </a:lvl2pPr>
-      <a:lvl3pPr marL="1143000" indent="-228600" algn="l" defTabSz="914400" rtl="0" eaLnBrk="1" latinLnBrk="0" hangingPunct="1">
+      <a:lvl3pPr marL="971550" indent="-194310" algn="l" defTabSz="777240" rtl="0" eaLnBrk="1" latinLnBrk="0" hangingPunct="1">
         <a:lnSpc>
           <a:spcPct val="90000"/>
         </a:lnSpc>
         <a:spcBef>
-          <a:spcPts val="500"/>
+          <a:spcPts val="425"/>
         </a:spcBef>
         <a:buFont typeface="Arial" panose="020B0604020202020204" pitchFamily="34" charset="0"/>
         <a:buChar char="•"/>
-        <a:defRPr sz="2000" kern="1200">
+        <a:defRPr sz="1700" kern="1200">
           <a:solidFill>
             <a:schemeClr val="tx1"/>
           </a:solidFill>
@@ -2739,16 +2746,16 @@
           <a:cs typeface="+mn-cs"/>
         </a:defRPr>
       </a:lvl3pPr>
-      <a:lvl4pPr marL="1600200" indent="-228600" algn="l" defTabSz="914400" rtl="0" eaLnBrk="1" latinLnBrk="0" hangingPunct="1">
+      <a:lvl4pPr marL="1360170" indent="-194310" algn="l" defTabSz="777240" rtl="0" eaLnBrk="1" latinLnBrk="0" hangingPunct="1">
         <a:lnSpc>
           <a:spcPct val="90000"/>
         </a:lnSpc>
         <a:spcBef>
-          <a:spcPts val="500"/>
+          <a:spcPts val="425"/>
         </a:spcBef>
         <a:buFont typeface="Arial" panose="020B0604020202020204" pitchFamily="34" charset="0"/>
         <a:buChar char="•"/>
-        <a:defRPr sz="1800" kern="1200">
+        <a:defRPr sz="1530" kern="1200">
           <a:solidFill>
             <a:schemeClr val="tx1"/>
           </a:solidFill>
@@ -2757,16 +2764,16 @@
           <a:cs typeface="+mn-cs"/>
         </a:defRPr>
       </a:lvl4pPr>
-      <a:lvl5pPr marL="2057400" indent="-228600" algn="l" defTabSz="914400" rtl="0" eaLnBrk="1" latinLnBrk="0" hangingPunct="1">
+      <a:lvl5pPr marL="1748790" indent="-194310" algn="l" defTabSz="777240" rtl="0" eaLnBrk="1" latinLnBrk="0" hangingPunct="1">
         <a:lnSpc>
           <a:spcPct val="90000"/>
         </a:lnSpc>
         <a:spcBef>
-          <a:spcPts val="500"/>
+          <a:spcPts val="425"/>
         </a:spcBef>
         <a:buFont typeface="Arial" panose="020B0604020202020204" pitchFamily="34" charset="0"/>
         <a:buChar char="•"/>
-        <a:defRPr sz="1800" kern="1200">
+        <a:defRPr sz="1530" kern="1200">
           <a:solidFill>
             <a:schemeClr val="tx1"/>
           </a:solidFill>
@@ -2775,16 +2782,16 @@
           <a:cs typeface="+mn-cs"/>
         </a:defRPr>
       </a:lvl5pPr>
-      <a:lvl6pPr marL="2514600" indent="-228600" algn="l" defTabSz="914400" rtl="0" eaLnBrk="1" latinLnBrk="0" hangingPunct="1">
+      <a:lvl6pPr marL="2137410" indent="-194310" algn="l" defTabSz="777240" rtl="0" eaLnBrk="1" latinLnBrk="0" hangingPunct="1">
         <a:lnSpc>
           <a:spcPct val="90000"/>
         </a:lnSpc>
         <a:spcBef>
-          <a:spcPts val="500"/>
+          <a:spcPts val="425"/>
         </a:spcBef>
         <a:buFont typeface="Arial" panose="020B0604020202020204" pitchFamily="34" charset="0"/>
         <a:buChar char="•"/>
-        <a:defRPr sz="1800" kern="1200">
+        <a:defRPr sz="1530" kern="1200">
           <a:solidFill>
             <a:schemeClr val="tx1"/>
           </a:solidFill>
@@ -2793,16 +2800,16 @@
           <a:cs typeface="+mn-cs"/>
         </a:defRPr>
       </a:lvl6pPr>
-      <a:lvl7pPr marL="2971800" indent="-228600" algn="l" defTabSz="914400" rtl="0" eaLnBrk="1" latinLnBrk="0" hangingPunct="1">
+      <a:lvl7pPr marL="2526030" indent="-194310" algn="l" defTabSz="777240" rtl="0" eaLnBrk="1" latinLnBrk="0" hangingPunct="1">
         <a:lnSpc>
           <a:spcPct val="90000"/>
         </a:lnSpc>
         <a:spcBef>
-          <a:spcPts val="500"/>
+          <a:spcPts val="425"/>
         </a:spcBef>
         <a:buFont typeface="Arial" panose="020B0604020202020204" pitchFamily="34" charset="0"/>
         <a:buChar char="•"/>
-        <a:defRPr sz="1800" kern="1200">
+        <a:defRPr sz="1530" kern="1200">
           <a:solidFill>
             <a:schemeClr val="tx1"/>
           </a:solidFill>
@@ -2811,16 +2818,16 @@
           <a:cs typeface="+mn-cs"/>
         </a:defRPr>
       </a:lvl7pPr>
-      <a:lvl8pPr marL="3429000" indent="-228600" algn="l" defTabSz="914400" rtl="0" eaLnBrk="1" latinLnBrk="0" hangingPunct="1">
+      <a:lvl8pPr marL="2914650" indent="-194310" algn="l" defTabSz="777240" rtl="0" eaLnBrk="1" latinLnBrk="0" hangingPunct="1">
         <a:lnSpc>
           <a:spcPct val="90000"/>
         </a:lnSpc>
         <a:spcBef>
-          <a:spcPts val="500"/>
+          <a:spcPts val="425"/>
         </a:spcBef>
         <a:buFont typeface="Arial" panose="020B0604020202020204" pitchFamily="34" charset="0"/>
         <a:buChar char="•"/>
-        <a:defRPr sz="1800" kern="1200">
+        <a:defRPr sz="1530" kern="1200">
           <a:solidFill>
             <a:schemeClr val="tx1"/>
           </a:solidFill>
@@ -2829,16 +2836,16 @@
           <a:cs typeface="+mn-cs"/>
         </a:defRPr>
       </a:lvl8pPr>
-      <a:lvl9pPr marL="3886200" indent="-228600" algn="l" defTabSz="914400" rtl="0" eaLnBrk="1" latinLnBrk="0" hangingPunct="1">
+      <a:lvl9pPr marL="3303270" indent="-194310" algn="l" defTabSz="777240" rtl="0" eaLnBrk="1" latinLnBrk="0" hangingPunct="1">
         <a:lnSpc>
           <a:spcPct val="90000"/>
         </a:lnSpc>
         <a:spcBef>
-          <a:spcPts val="500"/>
+          <a:spcPts val="425"/>
         </a:spcBef>
         <a:buFont typeface="Arial" panose="020B0604020202020204" pitchFamily="34" charset="0"/>
         <a:buChar char="•"/>
-        <a:defRPr sz="1800" kern="1200">
+        <a:defRPr sz="1530" kern="1200">
           <a:solidFill>
             <a:schemeClr val="tx1"/>
           </a:solidFill>
@@ -2852,8 +2859,8 @@
       <a:defPPr>
         <a:defRPr lang="en-US"/>
       </a:defPPr>
-      <a:lvl1pPr marL="0" algn="l" defTabSz="914400" rtl="0" eaLnBrk="1" latinLnBrk="0" hangingPunct="1">
-        <a:defRPr sz="1800" kern="1200">
+      <a:lvl1pPr marL="0" algn="l" defTabSz="777240" rtl="0" eaLnBrk="1" latinLnBrk="0" hangingPunct="1">
+        <a:defRPr sz="1530" kern="1200">
           <a:solidFill>
             <a:schemeClr val="tx1"/>
           </a:solidFill>
@@ -2862,8 +2869,8 @@
           <a:cs typeface="+mn-cs"/>
         </a:defRPr>
       </a:lvl1pPr>
-      <a:lvl2pPr marL="457200" algn="l" defTabSz="914400" rtl="0" eaLnBrk="1" latinLnBrk="0" hangingPunct="1">
-        <a:defRPr sz="1800" kern="1200">
+      <a:lvl2pPr marL="388620" algn="l" defTabSz="777240" rtl="0" eaLnBrk="1" latinLnBrk="0" hangingPunct="1">
+        <a:defRPr sz="1530" kern="1200">
           <a:solidFill>
             <a:schemeClr val="tx1"/>
           </a:solidFill>
@@ -2872,8 +2879,8 @@
           <a:cs typeface="+mn-cs"/>
         </a:defRPr>
       </a:lvl2pPr>
-      <a:lvl3pPr marL="914400" algn="l" defTabSz="914400" rtl="0" eaLnBrk="1" latinLnBrk="0" hangingPunct="1">
-        <a:defRPr sz="1800" kern="1200">
+      <a:lvl3pPr marL="777240" algn="l" defTabSz="777240" rtl="0" eaLnBrk="1" latinLnBrk="0" hangingPunct="1">
+        <a:defRPr sz="1530" kern="1200">
           <a:solidFill>
             <a:schemeClr val="tx1"/>
           </a:solidFill>
@@ -2882,8 +2889,8 @@
           <a:cs typeface="+mn-cs"/>
         </a:defRPr>
       </a:lvl3pPr>
-      <a:lvl4pPr marL="1371600" algn="l" defTabSz="914400" rtl="0" eaLnBrk="1" latinLnBrk="0" hangingPunct="1">
-        <a:defRPr sz="1800" kern="1200">
+      <a:lvl4pPr marL="1165860" algn="l" defTabSz="777240" rtl="0" eaLnBrk="1" latinLnBrk="0" hangingPunct="1">
+        <a:defRPr sz="1530" kern="1200">
           <a:solidFill>
             <a:schemeClr val="tx1"/>
           </a:solidFill>
@@ -2892,8 +2899,8 @@
           <a:cs typeface="+mn-cs"/>
         </a:defRPr>
       </a:lvl4pPr>
-      <a:lvl5pPr marL="1828800" algn="l" defTabSz="914400" rtl="0" eaLnBrk="1" latinLnBrk="0" hangingPunct="1">
-        <a:defRPr sz="1800" kern="1200">
+      <a:lvl5pPr marL="1554480" algn="l" defTabSz="777240" rtl="0" eaLnBrk="1" latinLnBrk="0" hangingPunct="1">
+        <a:defRPr sz="1530" kern="1200">
           <a:solidFill>
             <a:schemeClr val="tx1"/>
           </a:solidFill>
@@ -2902,8 +2909,8 @@
           <a:cs typeface="+mn-cs"/>
         </a:defRPr>
       </a:lvl5pPr>
-      <a:lvl6pPr marL="2286000" algn="l" defTabSz="914400" rtl="0" eaLnBrk="1" latinLnBrk="0" hangingPunct="1">
-        <a:defRPr sz="1800" kern="1200">
+      <a:lvl6pPr marL="1943100" algn="l" defTabSz="777240" rtl="0" eaLnBrk="1" latinLnBrk="0" hangingPunct="1">
+        <a:defRPr sz="1530" kern="1200">
           <a:solidFill>
             <a:schemeClr val="tx1"/>
           </a:solidFill>
@@ -2912,8 +2919,8 @@
           <a:cs typeface="+mn-cs"/>
         </a:defRPr>
       </a:lvl6pPr>
-      <a:lvl7pPr marL="2743200" algn="l" defTabSz="914400" rtl="0" eaLnBrk="1" latinLnBrk="0" hangingPunct="1">
-        <a:defRPr sz="1800" kern="1200">
+      <a:lvl7pPr marL="2331720" algn="l" defTabSz="777240" rtl="0" eaLnBrk="1" latinLnBrk="0" hangingPunct="1">
+        <a:defRPr sz="1530" kern="1200">
           <a:solidFill>
             <a:schemeClr val="tx1"/>
           </a:solidFill>
@@ -2922,8 +2929,8 @@
           <a:cs typeface="+mn-cs"/>
         </a:defRPr>
       </a:lvl7pPr>
-      <a:lvl8pPr marL="3200400" algn="l" defTabSz="914400" rtl="0" eaLnBrk="1" latinLnBrk="0" hangingPunct="1">
-        <a:defRPr sz="1800" kern="1200">
+      <a:lvl8pPr marL="2720340" algn="l" defTabSz="777240" rtl="0" eaLnBrk="1" latinLnBrk="0" hangingPunct="1">
+        <a:defRPr sz="1530" kern="1200">
           <a:solidFill>
             <a:schemeClr val="tx1"/>
           </a:solidFill>
@@ -2932,8 +2939,8 @@
           <a:cs typeface="+mn-cs"/>
         </a:defRPr>
       </a:lvl8pPr>
-      <a:lvl9pPr marL="3657600" algn="l" defTabSz="914400" rtl="0" eaLnBrk="1" latinLnBrk="0" hangingPunct="1">
-        <a:defRPr sz="1800" kern="1200">
+      <a:lvl9pPr marL="3108960" algn="l" defTabSz="777240" rtl="0" eaLnBrk="1" latinLnBrk="0" hangingPunct="1">
+        <a:defRPr sz="1530" kern="1200">
           <a:solidFill>
             <a:schemeClr val="tx1"/>
           </a:solidFill>
@@ -2966,7 +2973,7 @@
       </p:grpSpPr>
       <p:pic>
         <p:nvPicPr>
-          <p:cNvPr id="4" name="Picture 3"/>
+          <p:cNvPr id="2" name="Picture 1"/>
           <p:cNvPicPr>
             <a:picLocks noChangeAspect="1"/>
           </p:cNvPicPr>
@@ -2986,7 +2993,7 @@
         </p:blipFill>
         <p:spPr>
           <a:xfrm>
-            <a:off x="2209792" y="91433"/>
+            <a:off x="-8" y="-642"/>
             <a:ext cx="7772416" cy="6675134"/>
           </a:xfrm>
           <a:prstGeom prst="rect">
@@ -3015,7 +3022,7 @@
         </p:blipFill>
         <p:spPr>
           <a:xfrm>
-            <a:off x="4213781" y="2382537"/>
+            <a:off x="1960950" y="5430826"/>
             <a:ext cx="631595" cy="700029"/>
           </a:xfrm>
           <a:prstGeom prst="ellipse">
@@ -3066,7 +3073,7 @@
         </p:blipFill>
         <p:spPr>
           <a:xfrm>
-            <a:off x="6755096" y="420557"/>
+            <a:off x="4545296" y="328482"/>
             <a:ext cx="597810" cy="775468"/>
           </a:xfrm>
           <a:prstGeom prst="ellipse">
@@ -3117,7 +3124,7 @@
         </p:blipFill>
         <p:spPr>
           <a:xfrm>
-            <a:off x="7782525" y="2555845"/>
+            <a:off x="5572725" y="2463771"/>
             <a:ext cx="484784" cy="526721"/>
           </a:xfrm>
           <a:prstGeom prst="ellipse">
@@ -3168,7 +3175,7 @@
         </p:blipFill>
         <p:spPr>
           <a:xfrm>
-            <a:off x="2758143" y="3630375"/>
+            <a:off x="538916" y="328482"/>
             <a:ext cx="644934" cy="697582"/>
           </a:xfrm>
           <a:prstGeom prst="ellipse">
@@ -3219,7 +3226,7 @@
         </p:blipFill>
         <p:spPr>
           <a:xfrm>
-            <a:off x="6763301" y="5524106"/>
+            <a:off x="4553502" y="5432032"/>
             <a:ext cx="589605" cy="735349"/>
           </a:xfrm>
           <a:prstGeom prst="ellipse">
@@ -3270,7 +3277,7 @@
         </p:blipFill>
         <p:spPr>
           <a:xfrm>
-            <a:off x="9394926" y="3630375"/>
+            <a:off x="7185126" y="3538300"/>
             <a:ext cx="503218" cy="617454"/>
           </a:xfrm>
           <a:prstGeom prst="ellipse">
@@ -3316,7 +3323,7 @@
 <file path=ppt/theme/theme1.xml><?xml version="1.0" encoding="utf-8"?>
 <a:theme xmlns:a="http://schemas.openxmlformats.org/drawingml/2006/main" name="Office Theme">
   <a:themeElements>
-    <a:clrScheme name="Office">
+    <a:clrScheme name="Office Theme">
       <a:dk1>
         <a:sysClr val="windowText" lastClr="000000"/>
       </a:dk1>
@@ -3354,7 +3361,7 @@
         <a:srgbClr val="954F72"/>
       </a:folHlink>
     </a:clrScheme>
-    <a:fontScheme name="Office">
+    <a:fontScheme name="Office Theme">
       <a:majorFont>
         <a:latin typeface="Calibri Light" panose="020F0302020204030204"/>
         <a:ea typeface=""/>
@@ -3426,7 +3433,7 @@
         <a:font script="Geor" typeface="Sylfaen"/>
       </a:minorFont>
     </a:fontScheme>
-    <a:fmtScheme name="Office">
+    <a:fmtScheme name="Office Theme">
       <a:fillStyleLst>
         <a:solidFill>
           <a:schemeClr val="phClr"/>

</xml_diff>